<commit_message>
add formula to summary
</commit_message>
<xml_diff>
--- a/summary.pptx
+++ b/summary.pptx
@@ -130,12 +130,12 @@
   <pc:docChgLst>
     <pc:chgData name="Xiaokang Zhang" userId="560ed40a-cbe5-4173-b474-956d5606273f" providerId="ADAL" clId="{236AC842-FBA5-4FE8-A5F6-0B79C75E9FAF}"/>
     <pc:docChg chg="modSld">
-      <pc:chgData name="Xiaokang Zhang" userId="560ed40a-cbe5-4173-b474-956d5606273f" providerId="ADAL" clId="{236AC842-FBA5-4FE8-A5F6-0B79C75E9FAF}" dt="2025-11-25T13:09:13.677" v="63" actId="1035"/>
+      <pc:chgData name="Xiaokang Zhang" userId="560ed40a-cbe5-4173-b474-956d5606273f" providerId="ADAL" clId="{236AC842-FBA5-4FE8-A5F6-0B79C75E9FAF}" dt="2025-11-26T05:30:36.804" v="189" actId="1076"/>
       <pc:docMkLst>
         <pc:docMk/>
       </pc:docMkLst>
-      <pc:sldChg chg="modSp mod">
-        <pc:chgData name="Xiaokang Zhang" userId="560ed40a-cbe5-4173-b474-956d5606273f" providerId="ADAL" clId="{236AC842-FBA5-4FE8-A5F6-0B79C75E9FAF}" dt="2025-11-25T13:08:34.778" v="9" actId="1035"/>
+      <pc:sldChg chg="addSp modSp mod">
+        <pc:chgData name="Xiaokang Zhang" userId="560ed40a-cbe5-4173-b474-956d5606273f" providerId="ADAL" clId="{236AC842-FBA5-4FE8-A5F6-0B79C75E9FAF}" dt="2025-11-26T05:23:46.080" v="113" actId="2711"/>
         <pc:sldMkLst>
           <pc:docMk/>
           <pc:sldMk cId="3223663447" sldId="257"/>
@@ -148,9 +148,57 @@
             <ac:spMk id="2" creationId="{A326BA0C-CDB8-9147-8502-FAE417303D1E}"/>
           </ac:spMkLst>
         </pc:spChg>
+        <pc:spChg chg="add mod">
+          <ac:chgData name="Xiaokang Zhang" userId="560ed40a-cbe5-4173-b474-956d5606273f" providerId="ADAL" clId="{236AC842-FBA5-4FE8-A5F6-0B79C75E9FAF}" dt="2025-11-26T05:23:46.080" v="113" actId="2711"/>
+          <ac:spMkLst>
+            <pc:docMk/>
+            <pc:sldMk cId="3223663447" sldId="257"/>
+            <ac:spMk id="3" creationId="{15C3C74A-39CE-EF2C-1267-2E09CAA40B1C}"/>
+          </ac:spMkLst>
+        </pc:spChg>
+        <pc:spChg chg="mod">
+          <ac:chgData name="Xiaokang Zhang" userId="560ed40a-cbe5-4173-b474-956d5606273f" providerId="ADAL" clId="{236AC842-FBA5-4FE8-A5F6-0B79C75E9FAF}" dt="2025-11-26T05:23:39.581" v="112" actId="2711"/>
+          <ac:spMkLst>
+            <pc:docMk/>
+            <pc:sldMk cId="3223663447" sldId="257"/>
+            <ac:spMk id="13" creationId="{AEE053BD-06F6-A548-0100-8F02612D6867}"/>
+          </ac:spMkLst>
+        </pc:spChg>
+        <pc:picChg chg="mod">
+          <ac:chgData name="Xiaokang Zhang" userId="560ed40a-cbe5-4173-b474-956d5606273f" providerId="ADAL" clId="{236AC842-FBA5-4FE8-A5F6-0B79C75E9FAF}" dt="2025-11-26T05:22:36.600" v="109" actId="1076"/>
+          <ac:picMkLst>
+            <pc:docMk/>
+            <pc:sldMk cId="3223663447" sldId="257"/>
+            <ac:picMk id="7" creationId="{11BE5063-C153-D43E-69E6-49567CAC4184}"/>
+          </ac:picMkLst>
+        </pc:picChg>
+        <pc:picChg chg="mod">
+          <ac:chgData name="Xiaokang Zhang" userId="560ed40a-cbe5-4173-b474-956d5606273f" providerId="ADAL" clId="{236AC842-FBA5-4FE8-A5F6-0B79C75E9FAF}" dt="2025-11-26T05:22:36.600" v="109" actId="1076"/>
+          <ac:picMkLst>
+            <pc:docMk/>
+            <pc:sldMk cId="3223663447" sldId="257"/>
+            <ac:picMk id="9" creationId="{EE178084-8036-DC2E-CF93-255F47765C30}"/>
+          </ac:picMkLst>
+        </pc:picChg>
+        <pc:picChg chg="mod">
+          <ac:chgData name="Xiaokang Zhang" userId="560ed40a-cbe5-4173-b474-956d5606273f" providerId="ADAL" clId="{236AC842-FBA5-4FE8-A5F6-0B79C75E9FAF}" dt="2025-11-26T05:22:48.617" v="111" actId="1076"/>
+          <ac:picMkLst>
+            <pc:docMk/>
+            <pc:sldMk cId="3223663447" sldId="257"/>
+            <ac:picMk id="14" creationId="{40C21F16-B2E6-3322-9AAC-E9E001567AFF}"/>
+          </ac:picMkLst>
+        </pc:picChg>
+        <pc:picChg chg="mod">
+          <ac:chgData name="Xiaokang Zhang" userId="560ed40a-cbe5-4173-b474-956d5606273f" providerId="ADAL" clId="{236AC842-FBA5-4FE8-A5F6-0B79C75E9FAF}" dt="2025-11-26T05:22:48.617" v="111" actId="1076"/>
+          <ac:picMkLst>
+            <pc:docMk/>
+            <pc:sldMk cId="3223663447" sldId="257"/>
+            <ac:picMk id="16" creationId="{81104D87-F554-F458-8965-22D39545FB1A}"/>
+          </ac:picMkLst>
+        </pc:picChg>
       </pc:sldChg>
-      <pc:sldChg chg="modSp mod">
-        <pc:chgData name="Xiaokang Zhang" userId="560ed40a-cbe5-4173-b474-956d5606273f" providerId="ADAL" clId="{236AC842-FBA5-4FE8-A5F6-0B79C75E9FAF}" dt="2025-11-25T13:09:13.677" v="63" actId="1035"/>
+      <pc:sldChg chg="addSp modSp mod">
+        <pc:chgData name="Xiaokang Zhang" userId="560ed40a-cbe5-4173-b474-956d5606273f" providerId="ADAL" clId="{236AC842-FBA5-4FE8-A5F6-0B79C75E9FAF}" dt="2025-11-26T05:24:33.952" v="143" actId="1076"/>
         <pc:sldMkLst>
           <pc:docMk/>
           <pc:sldMk cId="867231761" sldId="258"/>
@@ -163,8 +211,16 @@
             <ac:spMk id="2" creationId="{17184DDE-2585-A35A-98A2-55F3E2832C93}"/>
           </ac:spMkLst>
         </pc:spChg>
+        <pc:spChg chg="add mod">
+          <ac:chgData name="Xiaokang Zhang" userId="560ed40a-cbe5-4173-b474-956d5606273f" providerId="ADAL" clId="{236AC842-FBA5-4FE8-A5F6-0B79C75E9FAF}" dt="2025-11-26T05:24:33.952" v="143" actId="1076"/>
+          <ac:spMkLst>
+            <pc:docMk/>
+            <pc:sldMk cId="867231761" sldId="258"/>
+            <ac:spMk id="3" creationId="{3C31CC85-E893-3E6F-D413-7F35D636A814}"/>
+          </ac:spMkLst>
+        </pc:spChg>
         <pc:spChg chg="mod">
-          <ac:chgData name="Xiaokang Zhang" userId="560ed40a-cbe5-4173-b474-956d5606273f" providerId="ADAL" clId="{236AC842-FBA5-4FE8-A5F6-0B79C75E9FAF}" dt="2025-11-25T13:09:13.677" v="63" actId="1035"/>
+          <ac:chgData name="Xiaokang Zhang" userId="560ed40a-cbe5-4173-b474-956d5606273f" providerId="ADAL" clId="{236AC842-FBA5-4FE8-A5F6-0B79C75E9FAF}" dt="2025-11-26T05:24:03.505" v="114" actId="1076"/>
           <ac:spMkLst>
             <pc:docMk/>
             <pc:sldMk cId="867231761" sldId="258"/>
@@ -172,7 +228,7 @@
           </ac:spMkLst>
         </pc:spChg>
         <pc:spChg chg="mod">
-          <ac:chgData name="Xiaokang Zhang" userId="560ed40a-cbe5-4173-b474-956d5606273f" providerId="ADAL" clId="{236AC842-FBA5-4FE8-A5F6-0B79C75E9FAF}" dt="2025-11-25T13:09:13.677" v="63" actId="1035"/>
+          <ac:chgData name="Xiaokang Zhang" userId="560ed40a-cbe5-4173-b474-956d5606273f" providerId="ADAL" clId="{236AC842-FBA5-4FE8-A5F6-0B79C75E9FAF}" dt="2025-11-26T05:24:03.505" v="114" actId="1076"/>
           <ac:spMkLst>
             <pc:docMk/>
             <pc:sldMk cId="867231761" sldId="258"/>
@@ -180,7 +236,7 @@
           </ac:spMkLst>
         </pc:spChg>
         <pc:spChg chg="mod">
-          <ac:chgData name="Xiaokang Zhang" userId="560ed40a-cbe5-4173-b474-956d5606273f" providerId="ADAL" clId="{236AC842-FBA5-4FE8-A5F6-0B79C75E9FAF}" dt="2025-11-25T13:09:13.677" v="63" actId="1035"/>
+          <ac:chgData name="Xiaokang Zhang" userId="560ed40a-cbe5-4173-b474-956d5606273f" providerId="ADAL" clId="{236AC842-FBA5-4FE8-A5F6-0B79C75E9FAF}" dt="2025-11-26T05:24:03.505" v="114" actId="1076"/>
           <ac:spMkLst>
             <pc:docMk/>
             <pc:sldMk cId="867231761" sldId="258"/>
@@ -188,7 +244,7 @@
           </ac:spMkLst>
         </pc:spChg>
         <pc:spChg chg="mod">
-          <ac:chgData name="Xiaokang Zhang" userId="560ed40a-cbe5-4173-b474-956d5606273f" providerId="ADAL" clId="{236AC842-FBA5-4FE8-A5F6-0B79C75E9FAF}" dt="2025-11-25T13:09:13.677" v="63" actId="1035"/>
+          <ac:chgData name="Xiaokang Zhang" userId="560ed40a-cbe5-4173-b474-956d5606273f" providerId="ADAL" clId="{236AC842-FBA5-4FE8-A5F6-0B79C75E9FAF}" dt="2025-11-26T05:24:03.505" v="114" actId="1076"/>
           <ac:spMkLst>
             <pc:docMk/>
             <pc:sldMk cId="867231761" sldId="258"/>
@@ -196,7 +252,7 @@
           </ac:spMkLst>
         </pc:spChg>
         <pc:spChg chg="mod">
-          <ac:chgData name="Xiaokang Zhang" userId="560ed40a-cbe5-4173-b474-956d5606273f" providerId="ADAL" clId="{236AC842-FBA5-4FE8-A5F6-0B79C75E9FAF}" dt="2025-11-25T13:09:13.677" v="63" actId="1035"/>
+          <ac:chgData name="Xiaokang Zhang" userId="560ed40a-cbe5-4173-b474-956d5606273f" providerId="ADAL" clId="{236AC842-FBA5-4FE8-A5F6-0B79C75E9FAF}" dt="2025-11-26T05:24:03.505" v="114" actId="1076"/>
           <ac:spMkLst>
             <pc:docMk/>
             <pc:sldMk cId="867231761" sldId="258"/>
@@ -204,7 +260,7 @@
           </ac:spMkLst>
         </pc:spChg>
         <pc:picChg chg="mod">
-          <ac:chgData name="Xiaokang Zhang" userId="560ed40a-cbe5-4173-b474-956d5606273f" providerId="ADAL" clId="{236AC842-FBA5-4FE8-A5F6-0B79C75E9FAF}" dt="2025-11-25T13:09:13.677" v="63" actId="1035"/>
+          <ac:chgData name="Xiaokang Zhang" userId="560ed40a-cbe5-4173-b474-956d5606273f" providerId="ADAL" clId="{236AC842-FBA5-4FE8-A5F6-0B79C75E9FAF}" dt="2025-11-26T05:24:03.505" v="114" actId="1076"/>
           <ac:picMkLst>
             <pc:docMk/>
             <pc:sldMk cId="867231761" sldId="258"/>
@@ -212,7 +268,7 @@
           </ac:picMkLst>
         </pc:picChg>
         <pc:picChg chg="mod">
-          <ac:chgData name="Xiaokang Zhang" userId="560ed40a-cbe5-4173-b474-956d5606273f" providerId="ADAL" clId="{236AC842-FBA5-4FE8-A5F6-0B79C75E9FAF}" dt="2025-11-25T13:09:13.677" v="63" actId="1035"/>
+          <ac:chgData name="Xiaokang Zhang" userId="560ed40a-cbe5-4173-b474-956d5606273f" providerId="ADAL" clId="{236AC842-FBA5-4FE8-A5F6-0B79C75E9FAF}" dt="2025-11-26T05:24:03.505" v="114" actId="1076"/>
           <ac:picMkLst>
             <pc:docMk/>
             <pc:sldMk cId="867231761" sldId="258"/>
@@ -220,7 +276,7 @@
           </ac:picMkLst>
         </pc:picChg>
         <pc:picChg chg="mod">
-          <ac:chgData name="Xiaokang Zhang" userId="560ed40a-cbe5-4173-b474-956d5606273f" providerId="ADAL" clId="{236AC842-FBA5-4FE8-A5F6-0B79C75E9FAF}" dt="2025-11-25T13:09:13.677" v="63" actId="1035"/>
+          <ac:chgData name="Xiaokang Zhang" userId="560ed40a-cbe5-4173-b474-956d5606273f" providerId="ADAL" clId="{236AC842-FBA5-4FE8-A5F6-0B79C75E9FAF}" dt="2025-11-26T05:24:03.505" v="114" actId="1076"/>
           <ac:picMkLst>
             <pc:docMk/>
             <pc:sldMk cId="867231761" sldId="258"/>
@@ -228,8 +284,8 @@
           </ac:picMkLst>
         </pc:picChg>
       </pc:sldChg>
-      <pc:sldChg chg="modSp mod">
-        <pc:chgData name="Xiaokang Zhang" userId="560ed40a-cbe5-4173-b474-956d5606273f" providerId="ADAL" clId="{236AC842-FBA5-4FE8-A5F6-0B79C75E9FAF}" dt="2025-11-25T13:08:48.128" v="29" actId="1035"/>
+      <pc:sldChg chg="addSp modSp mod">
+        <pc:chgData name="Xiaokang Zhang" userId="560ed40a-cbe5-4173-b474-956d5606273f" providerId="ADAL" clId="{236AC842-FBA5-4FE8-A5F6-0B79C75E9FAF}" dt="2025-11-26T05:30:36.804" v="189" actId="1076"/>
         <pc:sldMkLst>
           <pc:docMk/>
           <pc:sldMk cId="789458241" sldId="259"/>
@@ -242,6 +298,150 @@
             <ac:spMk id="2" creationId="{61163C9E-A590-FE8D-7FBB-BF440F606B6F}"/>
           </ac:spMkLst>
         </pc:spChg>
+        <pc:spChg chg="add mod">
+          <ac:chgData name="Xiaokang Zhang" userId="560ed40a-cbe5-4173-b474-956d5606273f" providerId="ADAL" clId="{236AC842-FBA5-4FE8-A5F6-0B79C75E9FAF}" dt="2025-11-26T05:27:36.133" v="167" actId="1076"/>
+          <ac:spMkLst>
+            <pc:docMk/>
+            <pc:sldMk cId="789458241" sldId="259"/>
+            <ac:spMk id="3" creationId="{9F24ED29-C182-ED95-C912-8F37A0A72886}"/>
+          </ac:spMkLst>
+        </pc:spChg>
+        <pc:spChg chg="mod">
+          <ac:chgData name="Xiaokang Zhang" userId="560ed40a-cbe5-4173-b474-956d5606273f" providerId="ADAL" clId="{236AC842-FBA5-4FE8-A5F6-0B79C75E9FAF}" dt="2025-11-26T05:28:48.261" v="179" actId="1076"/>
+          <ac:spMkLst>
+            <pc:docMk/>
+            <pc:sldMk cId="789458241" sldId="259"/>
+            <ac:spMk id="6" creationId="{63F4430A-3AA9-A1A6-83B6-D0510FCC0FBA}"/>
+          </ac:spMkLst>
+        </pc:spChg>
+        <pc:spChg chg="mod">
+          <ac:chgData name="Xiaokang Zhang" userId="560ed40a-cbe5-4173-b474-956d5606273f" providerId="ADAL" clId="{236AC842-FBA5-4FE8-A5F6-0B79C75E9FAF}" dt="2025-11-26T05:28:48.261" v="179" actId="1076"/>
+          <ac:spMkLst>
+            <pc:docMk/>
+            <pc:sldMk cId="789458241" sldId="259"/>
+            <ac:spMk id="7" creationId="{81675FCA-66D2-D954-84FC-9B1C6CED31D7}"/>
+          </ac:spMkLst>
+        </pc:spChg>
+        <pc:spChg chg="add mod">
+          <ac:chgData name="Xiaokang Zhang" userId="560ed40a-cbe5-4173-b474-956d5606273f" providerId="ADAL" clId="{236AC842-FBA5-4FE8-A5F6-0B79C75E9FAF}" dt="2025-11-26T05:27:41.252" v="168" actId="1076"/>
+          <ac:spMkLst>
+            <pc:docMk/>
+            <pc:sldMk cId="789458241" sldId="259"/>
+            <ac:spMk id="8" creationId="{F898A85E-F9DD-1BD9-D814-809AE4BA149E}"/>
+          </ac:spMkLst>
+        </pc:spChg>
+        <pc:spChg chg="mod">
+          <ac:chgData name="Xiaokang Zhang" userId="560ed40a-cbe5-4173-b474-956d5606273f" providerId="ADAL" clId="{236AC842-FBA5-4FE8-A5F6-0B79C75E9FAF}" dt="2025-11-26T05:28:48.261" v="179" actId="1076"/>
+          <ac:spMkLst>
+            <pc:docMk/>
+            <pc:sldMk cId="789458241" sldId="259"/>
+            <ac:spMk id="9" creationId="{EED5B327-AE13-BE93-8E08-F7746659469C}"/>
+          </ac:spMkLst>
+        </pc:spChg>
+        <pc:spChg chg="mod">
+          <ac:chgData name="Xiaokang Zhang" userId="560ed40a-cbe5-4173-b474-956d5606273f" providerId="ADAL" clId="{236AC842-FBA5-4FE8-A5F6-0B79C75E9FAF}" dt="2025-11-26T05:28:48.261" v="179" actId="1076"/>
+          <ac:spMkLst>
+            <pc:docMk/>
+            <pc:sldMk cId="789458241" sldId="259"/>
+            <ac:spMk id="17" creationId="{B5AB7329-3BCC-B236-DEEC-180D7C622C16}"/>
+          </ac:spMkLst>
+        </pc:spChg>
+        <pc:spChg chg="mod">
+          <ac:chgData name="Xiaokang Zhang" userId="560ed40a-cbe5-4173-b474-956d5606273f" providerId="ADAL" clId="{236AC842-FBA5-4FE8-A5F6-0B79C75E9FAF}" dt="2025-11-26T05:28:48.261" v="179" actId="1076"/>
+          <ac:spMkLst>
+            <pc:docMk/>
+            <pc:sldMk cId="789458241" sldId="259"/>
+            <ac:spMk id="20" creationId="{8D8FA8A4-E487-E939-DB4A-3B906062FA64}"/>
+          </ac:spMkLst>
+        </pc:spChg>
+        <pc:spChg chg="mod">
+          <ac:chgData name="Xiaokang Zhang" userId="560ed40a-cbe5-4173-b474-956d5606273f" providerId="ADAL" clId="{236AC842-FBA5-4FE8-A5F6-0B79C75E9FAF}" dt="2025-11-26T05:28:48.261" v="179" actId="1076"/>
+          <ac:spMkLst>
+            <pc:docMk/>
+            <pc:sldMk cId="789458241" sldId="259"/>
+            <ac:spMk id="25" creationId="{66AFC017-0DAC-6DB8-05BF-0D27C9F9325B}"/>
+          </ac:spMkLst>
+        </pc:spChg>
+        <pc:picChg chg="mod">
+          <ac:chgData name="Xiaokang Zhang" userId="560ed40a-cbe5-4173-b474-956d5606273f" providerId="ADAL" clId="{236AC842-FBA5-4FE8-A5F6-0B79C75E9FAF}" dt="2025-11-26T05:27:29.664" v="166" actId="1076"/>
+          <ac:picMkLst>
+            <pc:docMk/>
+            <pc:sldMk cId="789458241" sldId="259"/>
+            <ac:picMk id="4" creationId="{16966D8D-50E5-D9EE-065D-B62DFF1CE1D8}"/>
+          </ac:picMkLst>
+        </pc:picChg>
+        <pc:picChg chg="mod">
+          <ac:chgData name="Xiaokang Zhang" userId="560ed40a-cbe5-4173-b474-956d5606273f" providerId="ADAL" clId="{236AC842-FBA5-4FE8-A5F6-0B79C75E9FAF}" dt="2025-11-26T05:27:23.536" v="165" actId="1076"/>
+          <ac:picMkLst>
+            <pc:docMk/>
+            <pc:sldMk cId="789458241" sldId="259"/>
+            <ac:picMk id="5" creationId="{EBD517D1-DD60-C809-D440-9409A5116234}"/>
+          </ac:picMkLst>
+        </pc:picChg>
+        <pc:picChg chg="mod">
+          <ac:chgData name="Xiaokang Zhang" userId="560ed40a-cbe5-4173-b474-956d5606273f" providerId="ADAL" clId="{236AC842-FBA5-4FE8-A5F6-0B79C75E9FAF}" dt="2025-11-26T05:27:23.536" v="165" actId="1076"/>
+          <ac:picMkLst>
+            <pc:docMk/>
+            <pc:sldMk cId="789458241" sldId="259"/>
+            <ac:picMk id="12" creationId="{14A40070-2270-1F82-0B58-E6E2A3AB9B9B}"/>
+          </ac:picMkLst>
+        </pc:picChg>
+        <pc:picChg chg="mod">
+          <ac:chgData name="Xiaokang Zhang" userId="560ed40a-cbe5-4173-b474-956d5606273f" providerId="ADAL" clId="{236AC842-FBA5-4FE8-A5F6-0B79C75E9FAF}" dt="2025-11-26T05:27:23.536" v="165" actId="1076"/>
+          <ac:picMkLst>
+            <pc:docMk/>
+            <pc:sldMk cId="789458241" sldId="259"/>
+            <ac:picMk id="14" creationId="{37A51F93-150E-947A-D73D-610FC35C0C66}"/>
+          </ac:picMkLst>
+        </pc:picChg>
+        <pc:picChg chg="mod">
+          <ac:chgData name="Xiaokang Zhang" userId="560ed40a-cbe5-4173-b474-956d5606273f" providerId="ADAL" clId="{236AC842-FBA5-4FE8-A5F6-0B79C75E9FAF}" dt="2025-11-26T05:27:23.536" v="165" actId="1076"/>
+          <ac:picMkLst>
+            <pc:docMk/>
+            <pc:sldMk cId="789458241" sldId="259"/>
+            <ac:picMk id="16" creationId="{28E50F01-A761-FAEF-27E7-B57BCFF0CED8}"/>
+          </ac:picMkLst>
+        </pc:picChg>
+        <pc:picChg chg="mod">
+          <ac:chgData name="Xiaokang Zhang" userId="560ed40a-cbe5-4173-b474-956d5606273f" providerId="ADAL" clId="{236AC842-FBA5-4FE8-A5F6-0B79C75E9FAF}" dt="2025-11-26T05:30:36.804" v="189" actId="1076"/>
+          <ac:picMkLst>
+            <pc:docMk/>
+            <pc:sldMk cId="789458241" sldId="259"/>
+            <ac:picMk id="27" creationId="{C5B22E3C-BD06-E5F3-0BE6-B03BAE735CFA}"/>
+          </ac:picMkLst>
+        </pc:picChg>
+        <pc:cxnChg chg="add mod">
+          <ac:chgData name="Xiaokang Zhang" userId="560ed40a-cbe5-4173-b474-956d5606273f" providerId="ADAL" clId="{236AC842-FBA5-4FE8-A5F6-0B79C75E9FAF}" dt="2025-11-26T05:28:19.580" v="175" actId="1076"/>
+          <ac:cxnSpMkLst>
+            <pc:docMk/>
+            <pc:sldMk cId="789458241" sldId="259"/>
+            <ac:cxnSpMk id="11" creationId="{311C81DC-EE0E-FAD7-CADB-857B04CD50FF}"/>
+          </ac:cxnSpMkLst>
+        </pc:cxnChg>
+        <pc:cxnChg chg="add mod">
+          <ac:chgData name="Xiaokang Zhang" userId="560ed40a-cbe5-4173-b474-956d5606273f" providerId="ADAL" clId="{236AC842-FBA5-4FE8-A5F6-0B79C75E9FAF}" dt="2025-11-26T05:28:26.454" v="178" actId="1037"/>
+          <ac:cxnSpMkLst>
+            <pc:docMk/>
+            <pc:sldMk cId="789458241" sldId="259"/>
+            <ac:cxnSpMk id="13" creationId="{8A361142-3122-9830-314A-8A77C074BF21}"/>
+          </ac:cxnSpMkLst>
+        </pc:cxnChg>
+        <pc:cxnChg chg="add mod">
+          <ac:chgData name="Xiaokang Zhang" userId="560ed40a-cbe5-4173-b474-956d5606273f" providerId="ADAL" clId="{236AC842-FBA5-4FE8-A5F6-0B79C75E9FAF}" dt="2025-11-26T05:29:21.416" v="186" actId="14100"/>
+          <ac:cxnSpMkLst>
+            <pc:docMk/>
+            <pc:sldMk cId="789458241" sldId="259"/>
+            <ac:cxnSpMk id="18" creationId="{FE385B46-EB28-A696-5B07-0C9D08A83929}"/>
+          </ac:cxnSpMkLst>
+        </pc:cxnChg>
+        <pc:cxnChg chg="add mod">
+          <ac:chgData name="Xiaokang Zhang" userId="560ed40a-cbe5-4173-b474-956d5606273f" providerId="ADAL" clId="{236AC842-FBA5-4FE8-A5F6-0B79C75E9FAF}" dt="2025-11-26T05:29:31.268" v="188" actId="14100"/>
+          <ac:cxnSpMkLst>
+            <pc:docMk/>
+            <pc:sldMk cId="789458241" sldId="259"/>
+            <ac:cxnSpMk id="19" creationId="{810A1866-8AD1-53C1-8C73-E56A5F785D15}"/>
+          </ac:cxnSpMkLst>
+        </pc:cxnChg>
       </pc:sldChg>
     </pc:docChg>
   </pc:docChgLst>
@@ -397,7 +597,7 @@
           <a:p>
             <a:fld id="{0E58F973-8343-4ABA-8E9D-C7DA959EE69D}" type="datetimeFigureOut">
               <a:rPr lang="zh-CN" altLang="en-US" smtClean="0"/>
-              <a:t>2025/11/25</a:t>
+              <a:t>2025/11/26</a:t>
             </a:fld>
             <a:endParaRPr lang="zh-CN" altLang="en-US"/>
           </a:p>
@@ -597,7 +797,7 @@
           <a:p>
             <a:fld id="{0E58F973-8343-4ABA-8E9D-C7DA959EE69D}" type="datetimeFigureOut">
               <a:rPr lang="zh-CN" altLang="en-US" smtClean="0"/>
-              <a:t>2025/11/25</a:t>
+              <a:t>2025/11/26</a:t>
             </a:fld>
             <a:endParaRPr lang="zh-CN" altLang="en-US"/>
           </a:p>
@@ -807,7 +1007,7 @@
           <a:p>
             <a:fld id="{0E58F973-8343-4ABA-8E9D-C7DA959EE69D}" type="datetimeFigureOut">
               <a:rPr lang="zh-CN" altLang="en-US" smtClean="0"/>
-              <a:t>2025/11/25</a:t>
+              <a:t>2025/11/26</a:t>
             </a:fld>
             <a:endParaRPr lang="zh-CN" altLang="en-US"/>
           </a:p>
@@ -1007,7 +1207,7 @@
           <a:p>
             <a:fld id="{0E58F973-8343-4ABA-8E9D-C7DA959EE69D}" type="datetimeFigureOut">
               <a:rPr lang="zh-CN" altLang="en-US" smtClean="0"/>
-              <a:t>2025/11/25</a:t>
+              <a:t>2025/11/26</a:t>
             </a:fld>
             <a:endParaRPr lang="zh-CN" altLang="en-US"/>
           </a:p>
@@ -1283,7 +1483,7 @@
           <a:p>
             <a:fld id="{0E58F973-8343-4ABA-8E9D-C7DA959EE69D}" type="datetimeFigureOut">
               <a:rPr lang="zh-CN" altLang="en-US" smtClean="0"/>
-              <a:t>2025/11/25</a:t>
+              <a:t>2025/11/26</a:t>
             </a:fld>
             <a:endParaRPr lang="zh-CN" altLang="en-US"/>
           </a:p>
@@ -1551,7 +1751,7 @@
           <a:p>
             <a:fld id="{0E58F973-8343-4ABA-8E9D-C7DA959EE69D}" type="datetimeFigureOut">
               <a:rPr lang="zh-CN" altLang="en-US" smtClean="0"/>
-              <a:t>2025/11/25</a:t>
+              <a:t>2025/11/26</a:t>
             </a:fld>
             <a:endParaRPr lang="zh-CN" altLang="en-US"/>
           </a:p>
@@ -1966,7 +2166,7 @@
           <a:p>
             <a:fld id="{0E58F973-8343-4ABA-8E9D-C7DA959EE69D}" type="datetimeFigureOut">
               <a:rPr lang="zh-CN" altLang="en-US" smtClean="0"/>
-              <a:t>2025/11/25</a:t>
+              <a:t>2025/11/26</a:t>
             </a:fld>
             <a:endParaRPr lang="zh-CN" altLang="en-US"/>
           </a:p>
@@ -2108,7 +2308,7 @@
           <a:p>
             <a:fld id="{0E58F973-8343-4ABA-8E9D-C7DA959EE69D}" type="datetimeFigureOut">
               <a:rPr lang="zh-CN" altLang="en-US" smtClean="0"/>
-              <a:t>2025/11/25</a:t>
+              <a:t>2025/11/26</a:t>
             </a:fld>
             <a:endParaRPr lang="zh-CN" altLang="en-US"/>
           </a:p>
@@ -2221,7 +2421,7 @@
           <a:p>
             <a:fld id="{0E58F973-8343-4ABA-8E9D-C7DA959EE69D}" type="datetimeFigureOut">
               <a:rPr lang="zh-CN" altLang="en-US" smtClean="0"/>
-              <a:t>2025/11/25</a:t>
+              <a:t>2025/11/26</a:t>
             </a:fld>
             <a:endParaRPr lang="zh-CN" altLang="en-US"/>
           </a:p>
@@ -2534,7 +2734,7 @@
           <a:p>
             <a:fld id="{0E58F973-8343-4ABA-8E9D-C7DA959EE69D}" type="datetimeFigureOut">
               <a:rPr lang="zh-CN" altLang="en-US" smtClean="0"/>
-              <a:t>2025/11/25</a:t>
+              <a:t>2025/11/26</a:t>
             </a:fld>
             <a:endParaRPr lang="zh-CN" altLang="en-US"/>
           </a:p>
@@ -2823,7 +3023,7 @@
           <a:p>
             <a:fld id="{0E58F973-8343-4ABA-8E9D-C7DA959EE69D}" type="datetimeFigureOut">
               <a:rPr lang="zh-CN" altLang="en-US" smtClean="0"/>
-              <a:t>2025/11/25</a:t>
+              <a:t>2025/11/26</a:t>
             </a:fld>
             <a:endParaRPr lang="zh-CN" altLang="en-US"/>
           </a:p>
@@ -3066,7 +3266,7 @@
           <a:p>
             <a:fld id="{0E58F973-8343-4ABA-8E9D-C7DA959EE69D}" type="datetimeFigureOut">
               <a:rPr lang="zh-CN" altLang="en-US" smtClean="0"/>
-              <a:t>2025/11/25</a:t>
+              <a:t>2025/11/26</a:t>
             </a:fld>
             <a:endParaRPr lang="zh-CN" altLang="en-US"/>
           </a:p>
@@ -3577,7 +3777,7 @@
         </p:blipFill>
         <p:spPr>
           <a:xfrm>
-            <a:off x="7750551" y="1558745"/>
+            <a:off x="7867294" y="2706093"/>
             <a:ext cx="3486506" cy="286719"/>
           </a:xfrm>
           <a:prstGeom prst="rect">
@@ -3607,7 +3807,7 @@
         </p:blipFill>
         <p:spPr>
           <a:xfrm>
-            <a:off x="6291834" y="2027226"/>
+            <a:off x="6408577" y="3174574"/>
             <a:ext cx="4945223" cy="187654"/>
           </a:xfrm>
           <a:prstGeom prst="rect">
@@ -3629,7 +3829,7 @@
         </p:nvSpPr>
         <p:spPr>
           <a:xfrm>
-            <a:off x="6291834" y="3108574"/>
+            <a:off x="6408577" y="4126192"/>
             <a:ext cx="4145279" cy="369332"/>
           </a:xfrm>
           <a:prstGeom prst="rect">
@@ -3644,10 +3844,17 @@
           <a:lstStyle/>
           <a:p>
             <a:r>
-              <a:rPr lang="en-US" altLang="zh-CN" dirty="0"/>
+              <a:rPr lang="en-US" altLang="zh-CN" dirty="0">
+                <a:latin typeface="Calibri" panose="020F0502020204030204" pitchFamily="34" charset="0"/>
+                <a:ea typeface="Calibri" panose="020F0502020204030204" pitchFamily="34" charset="0"/>
+                <a:cs typeface="Calibri" panose="020F0502020204030204" pitchFamily="34" charset="0"/>
+              </a:rPr>
               <a:t>Considering the small-sample bias</a:t>
             </a:r>
-            <a:endParaRPr lang="zh-CN" altLang="en-US" dirty="0"/>
+            <a:endParaRPr lang="zh-CN" altLang="en-US" dirty="0">
+              <a:latin typeface="Calibri" panose="020F0502020204030204" pitchFamily="34" charset="0"/>
+              <a:cs typeface="Calibri" panose="020F0502020204030204" pitchFamily="34" charset="0"/>
+            </a:endParaRPr>
           </a:p>
         </p:txBody>
       </p:sp>
@@ -3673,7 +3880,7 @@
         </p:blipFill>
         <p:spPr>
           <a:xfrm>
-            <a:off x="7750551" y="3556691"/>
+            <a:off x="7867294" y="4574309"/>
             <a:ext cx="3486506" cy="286719"/>
           </a:xfrm>
           <a:prstGeom prst="rect">
@@ -3703,7 +3910,7 @@
         </p:blipFill>
         <p:spPr>
           <a:xfrm>
-            <a:off x="6291834" y="3973686"/>
+            <a:off x="6408577" y="4991304"/>
             <a:ext cx="5061966" cy="212312"/>
           </a:xfrm>
           <a:prstGeom prst="rect">
@@ -3711,6 +3918,89 @@
           </a:prstGeom>
         </p:spPr>
       </p:pic>
+      <p:sp>
+        <p:nvSpPr>
+          <p:cNvPr id="3" name="TextBox 2">
+            <a:extLst>
+              <a:ext uri="{FF2B5EF4-FFF2-40B4-BE49-F238E27FC236}">
+                <a16:creationId xmlns:a16="http://schemas.microsoft.com/office/drawing/2014/main" id="{15C3C74A-39CE-EF2C-1267-2E09CAA40B1C}"/>
+              </a:ext>
+            </a:extLst>
+          </p:cNvPr>
+          <p:cNvSpPr txBox="1"/>
+          <p:nvPr/>
+        </p:nvSpPr>
+        <p:spPr>
+          <a:xfrm>
+            <a:off x="6408577" y="1671862"/>
+            <a:ext cx="3791423" cy="369332"/>
+          </a:xfrm>
+          <a:prstGeom prst="rect">
+            <a:avLst/>
+          </a:prstGeom>
+          <a:noFill/>
+        </p:spPr>
+        <p:txBody>
+          <a:bodyPr wrap="none" rtlCol="0">
+            <a:spAutoFit/>
+          </a:bodyPr>
+          <a:lstStyle/>
+          <a:p>
+            <a:r>
+              <a:rPr lang="en-US" altLang="zh-CN" dirty="0" err="1">
+                <a:latin typeface="Calibri" panose="020F0502020204030204" pitchFamily="34" charset="0"/>
+                <a:ea typeface="Calibri" panose="020F0502020204030204" pitchFamily="34" charset="0"/>
+                <a:cs typeface="Calibri" panose="020F0502020204030204" pitchFamily="34" charset="0"/>
+              </a:rPr>
+              <a:t>Surv</a:t>
+            </a:r>
+            <a:r>
+              <a:rPr lang="en-US" altLang="zh-CN" dirty="0">
+                <a:latin typeface="Calibri" panose="020F0502020204030204" pitchFamily="34" charset="0"/>
+                <a:ea typeface="Calibri" panose="020F0502020204030204" pitchFamily="34" charset="0"/>
+                <a:cs typeface="Calibri" panose="020F0502020204030204" pitchFamily="34" charset="0"/>
+              </a:rPr>
+              <a:t>(</a:t>
+            </a:r>
+            <a:r>
+              <a:rPr lang="en-US" altLang="zh-CN" dirty="0" err="1">
+                <a:latin typeface="Calibri" panose="020F0502020204030204" pitchFamily="34" charset="0"/>
+                <a:ea typeface="Calibri" panose="020F0502020204030204" pitchFamily="34" charset="0"/>
+                <a:cs typeface="Calibri" panose="020F0502020204030204" pitchFamily="34" charset="0"/>
+              </a:rPr>
+              <a:t>time.pfs</a:t>
+            </a:r>
+            <a:r>
+              <a:rPr lang="en-US" altLang="zh-CN" dirty="0">
+                <a:latin typeface="Calibri" panose="020F0502020204030204" pitchFamily="34" charset="0"/>
+                <a:ea typeface="Calibri" panose="020F0502020204030204" pitchFamily="34" charset="0"/>
+                <a:cs typeface="Calibri" panose="020F0502020204030204" pitchFamily="34" charset="0"/>
+              </a:rPr>
+              <a:t>, </a:t>
+            </a:r>
+            <a:r>
+              <a:rPr lang="en-US" altLang="zh-CN" dirty="0" err="1">
+                <a:latin typeface="Calibri" panose="020F0502020204030204" pitchFamily="34" charset="0"/>
+                <a:ea typeface="Calibri" panose="020F0502020204030204" pitchFamily="34" charset="0"/>
+                <a:cs typeface="Calibri" panose="020F0502020204030204" pitchFamily="34" charset="0"/>
+              </a:rPr>
+              <a:t>event.pfs</a:t>
+            </a:r>
+            <a:r>
+              <a:rPr lang="en-US" altLang="zh-CN" dirty="0">
+                <a:latin typeface="Calibri" panose="020F0502020204030204" pitchFamily="34" charset="0"/>
+                <a:ea typeface="Calibri" panose="020F0502020204030204" pitchFamily="34" charset="0"/>
+                <a:cs typeface="Calibri" panose="020F0502020204030204" pitchFamily="34" charset="0"/>
+              </a:rPr>
+              <a:t>) ~ treatment</a:t>
+            </a:r>
+            <a:endParaRPr lang="zh-CN" altLang="en-US" dirty="0">
+              <a:latin typeface="Calibri" panose="020F0502020204030204" pitchFamily="34" charset="0"/>
+              <a:cs typeface="Calibri" panose="020F0502020204030204" pitchFamily="34" charset="0"/>
+            </a:endParaRPr>
+          </a:p>
+        </p:txBody>
+      </p:sp>
     </p:spTree>
     <p:extLst>
       <p:ext uri="{BB962C8B-B14F-4D97-AF65-F5344CB8AC3E}">
@@ -3812,7 +4102,7 @@
         </p:blipFill>
         <p:spPr>
           <a:xfrm>
-            <a:off x="3471972" y="1726862"/>
+            <a:off x="3792012" y="2092622"/>
             <a:ext cx="4195880" cy="416898"/>
           </a:xfrm>
           <a:prstGeom prst="rect">
@@ -3842,7 +4132,7 @@
         </p:blipFill>
         <p:spPr>
           <a:xfrm>
-            <a:off x="1881182" y="2191988"/>
+            <a:off x="2201222" y="2557748"/>
             <a:ext cx="5698178" cy="3388423"/>
           </a:xfrm>
           <a:prstGeom prst="rect">
@@ -3871,7 +4161,7 @@
         </p:blipFill>
         <p:spPr>
           <a:xfrm>
-            <a:off x="7789772" y="2212308"/>
+            <a:off x="8109812" y="2578068"/>
             <a:ext cx="673508" cy="3268521"/>
           </a:xfrm>
           <a:prstGeom prst="rect">
@@ -3893,7 +4183,7 @@
         </p:nvSpPr>
         <p:spPr>
           <a:xfrm>
-            <a:off x="7659891" y="1719936"/>
+            <a:off x="7979931" y="2085696"/>
             <a:ext cx="976549" cy="369332"/>
           </a:xfrm>
           <a:prstGeom prst="rect">
@@ -3929,7 +4219,7 @@
         </p:nvSpPr>
         <p:spPr>
           <a:xfrm>
-            <a:off x="8768520" y="1473200"/>
+            <a:off x="9088560" y="1838960"/>
             <a:ext cx="2112840" cy="646331"/>
           </a:xfrm>
           <a:prstGeom prst="rect">
@@ -3987,7 +4277,7 @@
         </p:nvSpPr>
         <p:spPr>
           <a:xfrm>
-            <a:off x="1881182" y="2611120"/>
+            <a:off x="2201222" y="2976880"/>
             <a:ext cx="5698178" cy="325120"/>
           </a:xfrm>
           <a:prstGeom prst="rect">
@@ -4043,7 +4333,7 @@
         </p:nvSpPr>
         <p:spPr>
           <a:xfrm>
-            <a:off x="1881182" y="3030252"/>
+            <a:off x="2201222" y="3396012"/>
             <a:ext cx="5698178" cy="325120"/>
           </a:xfrm>
           <a:prstGeom prst="rect">
@@ -4099,7 +4389,7 @@
         </p:nvSpPr>
         <p:spPr>
           <a:xfrm>
-            <a:off x="1881182" y="4767612"/>
+            <a:off x="2201222" y="5133372"/>
             <a:ext cx="5698178" cy="325120"/>
           </a:xfrm>
           <a:prstGeom prst="rect">
@@ -4138,6 +4428,105 @@
           <a:p>
             <a:pPr algn="ctr"/>
             <a:endParaRPr lang="zh-CN" altLang="en-US" dirty="0"/>
+          </a:p>
+        </p:txBody>
+      </p:sp>
+      <p:sp>
+        <p:nvSpPr>
+          <p:cNvPr id="3" name="TextBox 2">
+            <a:extLst>
+              <a:ext uri="{FF2B5EF4-FFF2-40B4-BE49-F238E27FC236}">
+                <a16:creationId xmlns:a16="http://schemas.microsoft.com/office/drawing/2014/main" id="{3C31CC85-E893-3E6F-D413-7F35D636A814}"/>
+              </a:ext>
+            </a:extLst>
+          </p:cNvPr>
+          <p:cNvSpPr txBox="1"/>
+          <p:nvPr/>
+        </p:nvSpPr>
+        <p:spPr>
+          <a:xfrm>
+            <a:off x="838200" y="1559592"/>
+            <a:ext cx="6122702" cy="369332"/>
+          </a:xfrm>
+          <a:prstGeom prst="rect">
+            <a:avLst/>
+          </a:prstGeom>
+          <a:noFill/>
+        </p:spPr>
+        <p:txBody>
+          <a:bodyPr wrap="none" rtlCol="0">
+            <a:spAutoFit/>
+          </a:bodyPr>
+          <a:lstStyle/>
+          <a:p>
+            <a:r>
+              <a:rPr lang="en-US" altLang="zh-CN" dirty="0" err="1">
+                <a:latin typeface="Calibri" panose="020F0502020204030204" pitchFamily="34" charset="0"/>
+                <a:ea typeface="Calibri" panose="020F0502020204030204" pitchFamily="34" charset="0"/>
+                <a:cs typeface="Calibri" panose="020F0502020204030204" pitchFamily="34" charset="0"/>
+              </a:rPr>
+              <a:t>Surv</a:t>
+            </a:r>
+            <a:r>
+              <a:rPr lang="en-US" altLang="zh-CN" dirty="0">
+                <a:latin typeface="Calibri" panose="020F0502020204030204" pitchFamily="34" charset="0"/>
+                <a:ea typeface="Calibri" panose="020F0502020204030204" pitchFamily="34" charset="0"/>
+                <a:cs typeface="Calibri" panose="020F0502020204030204" pitchFamily="34" charset="0"/>
+              </a:rPr>
+              <a:t>(</a:t>
+            </a:r>
+            <a:r>
+              <a:rPr lang="en-US" altLang="zh-CN" dirty="0" err="1">
+                <a:latin typeface="Calibri" panose="020F0502020204030204" pitchFamily="34" charset="0"/>
+                <a:ea typeface="Calibri" panose="020F0502020204030204" pitchFamily="34" charset="0"/>
+                <a:cs typeface="Calibri" panose="020F0502020204030204" pitchFamily="34" charset="0"/>
+              </a:rPr>
+              <a:t>time.pfs</a:t>
+            </a:r>
+            <a:r>
+              <a:rPr lang="en-US" altLang="zh-CN" dirty="0">
+                <a:latin typeface="Calibri" panose="020F0502020204030204" pitchFamily="34" charset="0"/>
+                <a:ea typeface="Calibri" panose="020F0502020204030204" pitchFamily="34" charset="0"/>
+                <a:cs typeface="Calibri" panose="020F0502020204030204" pitchFamily="34" charset="0"/>
+              </a:rPr>
+              <a:t>, </a:t>
+            </a:r>
+            <a:r>
+              <a:rPr lang="en-US" altLang="zh-CN" dirty="0" err="1">
+                <a:latin typeface="Calibri" panose="020F0502020204030204" pitchFamily="34" charset="0"/>
+                <a:ea typeface="Calibri" panose="020F0502020204030204" pitchFamily="34" charset="0"/>
+                <a:cs typeface="Calibri" panose="020F0502020204030204" pitchFamily="34" charset="0"/>
+              </a:rPr>
+              <a:t>event.pfs</a:t>
+            </a:r>
+            <a:r>
+              <a:rPr lang="en-US" altLang="zh-CN" dirty="0">
+                <a:latin typeface="Calibri" panose="020F0502020204030204" pitchFamily="34" charset="0"/>
+                <a:ea typeface="Calibri" panose="020F0502020204030204" pitchFamily="34" charset="0"/>
+                <a:cs typeface="Calibri" panose="020F0502020204030204" pitchFamily="34" charset="0"/>
+              </a:rPr>
+              <a:t>) ~ </a:t>
+            </a:r>
+            <a:r>
+              <a:rPr lang="en-US" altLang="zh-CN" dirty="0" err="1">
+                <a:latin typeface="Calibri" panose="020F0502020204030204" pitchFamily="34" charset="0"/>
+                <a:ea typeface="Calibri" panose="020F0502020204030204" pitchFamily="34" charset="0"/>
+                <a:cs typeface="Calibri" panose="020F0502020204030204" pitchFamily="34" charset="0"/>
+              </a:rPr>
+              <a:t>gene_expression</a:t>
+            </a:r>
+            <a:r>
+              <a:rPr lang="en-US" altLang="zh-CN" dirty="0">
+                <a:latin typeface="Calibri" panose="020F0502020204030204" pitchFamily="34" charset="0"/>
+                <a:ea typeface="Calibri" panose="020F0502020204030204" pitchFamily="34" charset="0"/>
+                <a:cs typeface="Calibri" panose="020F0502020204030204" pitchFamily="34" charset="0"/>
+              </a:rPr>
+              <a:t> + strata(treatment)</a:t>
+            </a:r>
+            <a:endParaRPr lang="zh-CN" altLang="en-US" dirty="0">
+              <a:latin typeface="Calibri" panose="020F0502020204030204" pitchFamily="34" charset="0"/>
+              <a:cs typeface="Calibri" panose="020F0502020204030204" pitchFamily="34" charset="0"/>
+            </a:endParaRPr>
           </a:p>
         </p:txBody>
       </p:sp>
@@ -4356,7 +4745,7 @@
         </p:blipFill>
         <p:spPr>
           <a:xfrm>
-            <a:off x="6797040" y="884008"/>
+            <a:off x="6558264" y="867364"/>
             <a:ext cx="5311922" cy="3543747"/>
           </a:xfrm>
           <a:prstGeom prst="rect">
@@ -4438,7 +4827,7 @@
         </p:blipFill>
         <p:spPr>
           <a:xfrm>
-            <a:off x="379730" y="1241853"/>
+            <a:off x="318770" y="1458010"/>
             <a:ext cx="4544059" cy="221188"/>
           </a:xfrm>
           <a:prstGeom prst="rect">
@@ -4467,7 +4856,7 @@
         </p:blipFill>
         <p:spPr>
           <a:xfrm>
-            <a:off x="288290" y="1463041"/>
+            <a:off x="297937" y="1652301"/>
             <a:ext cx="4544059" cy="2266095"/>
           </a:xfrm>
           <a:prstGeom prst="rect">
@@ -4489,7 +4878,7 @@
         </p:nvSpPr>
         <p:spPr>
           <a:xfrm>
-            <a:off x="393701" y="2374900"/>
+            <a:off x="366323" y="2551008"/>
             <a:ext cx="2197099" cy="221188"/>
           </a:xfrm>
           <a:prstGeom prst="rect">
@@ -4545,7 +4934,7 @@
         </p:nvSpPr>
         <p:spPr>
           <a:xfrm>
-            <a:off x="393701" y="3507948"/>
+            <a:off x="366323" y="3684056"/>
             <a:ext cx="2197099" cy="221188"/>
           </a:xfrm>
           <a:prstGeom prst="rect">
@@ -4601,7 +4990,7 @@
         </p:nvSpPr>
         <p:spPr>
           <a:xfrm>
-            <a:off x="393701" y="2655882"/>
+            <a:off x="366323" y="2831990"/>
             <a:ext cx="2197099" cy="221188"/>
           </a:xfrm>
           <a:prstGeom prst="rect">
@@ -4667,7 +5056,7 @@
         </p:blipFill>
         <p:spPr>
           <a:xfrm>
-            <a:off x="180342" y="4279879"/>
+            <a:off x="189989" y="4469139"/>
             <a:ext cx="2312050" cy="2230640"/>
           </a:xfrm>
           <a:prstGeom prst="rect">
@@ -4697,7 +5086,7 @@
         </p:blipFill>
         <p:spPr>
           <a:xfrm>
-            <a:off x="2661053" y="4279879"/>
+            <a:off x="2670700" y="4469139"/>
             <a:ext cx="2262736" cy="2230640"/>
           </a:xfrm>
           <a:prstGeom prst="rect">
@@ -4727,7 +5116,7 @@
         </p:blipFill>
         <p:spPr>
           <a:xfrm>
-            <a:off x="5092450" y="4269130"/>
+            <a:off x="5102097" y="4458390"/>
             <a:ext cx="2262736" cy="2241389"/>
           </a:xfrm>
           <a:prstGeom prst="rect">
@@ -4749,7 +5138,7 @@
         </p:nvSpPr>
         <p:spPr>
           <a:xfrm>
-            <a:off x="3996230" y="2374900"/>
+            <a:off x="3968852" y="2551008"/>
             <a:ext cx="836120" cy="221188"/>
           </a:xfrm>
           <a:prstGeom prst="rect">
@@ -4805,7 +5194,7 @@
         </p:nvSpPr>
         <p:spPr>
           <a:xfrm>
-            <a:off x="2875454" y="3507948"/>
+            <a:off x="2848076" y="3684056"/>
             <a:ext cx="836120" cy="221188"/>
           </a:xfrm>
           <a:prstGeom prst="rect">
@@ -4861,7 +5250,7 @@
         </p:nvSpPr>
         <p:spPr>
           <a:xfrm>
-            <a:off x="2875455" y="2655882"/>
+            <a:off x="2848077" y="2831990"/>
             <a:ext cx="836120" cy="221188"/>
           </a:xfrm>
           <a:prstGeom prst="rect">
@@ -5027,6 +5416,350 @@
           </a:p>
         </p:txBody>
       </p:sp>
+      <p:sp>
+        <p:nvSpPr>
+          <p:cNvPr id="3" name="TextBox 2">
+            <a:extLst>
+              <a:ext uri="{FF2B5EF4-FFF2-40B4-BE49-F238E27FC236}">
+                <a16:creationId xmlns:a16="http://schemas.microsoft.com/office/drawing/2014/main" id="{9F24ED29-C182-ED95-C912-8F37A0A72886}"/>
+              </a:ext>
+            </a:extLst>
+          </p:cNvPr>
+          <p:cNvSpPr txBox="1"/>
+          <p:nvPr/>
+        </p:nvSpPr>
+        <p:spPr>
+          <a:xfrm>
+            <a:off x="0" y="914094"/>
+            <a:ext cx="6593921" cy="307777"/>
+          </a:xfrm>
+          <a:prstGeom prst="rect">
+            <a:avLst/>
+          </a:prstGeom>
+          <a:noFill/>
+        </p:spPr>
+        <p:txBody>
+          <a:bodyPr wrap="none" rtlCol="0">
+            <a:spAutoFit/>
+          </a:bodyPr>
+          <a:lstStyle/>
+          <a:p>
+            <a:r>
+              <a:rPr lang="en-US" altLang="zh-CN" sz="1400" dirty="0" err="1">
+                <a:latin typeface="Calibri" panose="020F0502020204030204" pitchFamily="34" charset="0"/>
+                <a:ea typeface="Calibri" panose="020F0502020204030204" pitchFamily="34" charset="0"/>
+                <a:cs typeface="Calibri" panose="020F0502020204030204" pitchFamily="34" charset="0"/>
+              </a:rPr>
+              <a:t>Surv</a:t>
+            </a:r>
+            <a:r>
+              <a:rPr lang="en-US" altLang="zh-CN" sz="1400" dirty="0">
+                <a:latin typeface="Calibri" panose="020F0502020204030204" pitchFamily="34" charset="0"/>
+                <a:ea typeface="Calibri" panose="020F0502020204030204" pitchFamily="34" charset="0"/>
+                <a:cs typeface="Calibri" panose="020F0502020204030204" pitchFamily="34" charset="0"/>
+              </a:rPr>
+              <a:t>(</a:t>
+            </a:r>
+            <a:r>
+              <a:rPr lang="en-US" altLang="zh-CN" sz="1400" dirty="0" err="1">
+                <a:latin typeface="Calibri" panose="020F0502020204030204" pitchFamily="34" charset="0"/>
+                <a:ea typeface="Calibri" panose="020F0502020204030204" pitchFamily="34" charset="0"/>
+                <a:cs typeface="Calibri" panose="020F0502020204030204" pitchFamily="34" charset="0"/>
+              </a:rPr>
+              <a:t>time.pfs</a:t>
+            </a:r>
+            <a:r>
+              <a:rPr lang="en-US" altLang="zh-CN" sz="1400" dirty="0">
+                <a:latin typeface="Calibri" panose="020F0502020204030204" pitchFamily="34" charset="0"/>
+                <a:ea typeface="Calibri" panose="020F0502020204030204" pitchFamily="34" charset="0"/>
+                <a:cs typeface="Calibri" panose="020F0502020204030204" pitchFamily="34" charset="0"/>
+              </a:rPr>
+              <a:t>, </a:t>
+            </a:r>
+            <a:r>
+              <a:rPr lang="en-US" altLang="zh-CN" sz="1400" dirty="0" err="1">
+                <a:latin typeface="Calibri" panose="020F0502020204030204" pitchFamily="34" charset="0"/>
+                <a:ea typeface="Calibri" panose="020F0502020204030204" pitchFamily="34" charset="0"/>
+                <a:cs typeface="Calibri" panose="020F0502020204030204" pitchFamily="34" charset="0"/>
+              </a:rPr>
+              <a:t>event.pfs</a:t>
+            </a:r>
+            <a:r>
+              <a:rPr lang="en-US" altLang="zh-CN" sz="1400" dirty="0">
+                <a:latin typeface="Calibri" panose="020F0502020204030204" pitchFamily="34" charset="0"/>
+                <a:ea typeface="Calibri" panose="020F0502020204030204" pitchFamily="34" charset="0"/>
+                <a:cs typeface="Calibri" panose="020F0502020204030204" pitchFamily="34" charset="0"/>
+              </a:rPr>
+              <a:t>) ~ </a:t>
+            </a:r>
+            <a:r>
+              <a:rPr lang="en-US" altLang="zh-CN" sz="1400" dirty="0" err="1">
+                <a:latin typeface="Calibri" panose="020F0502020204030204" pitchFamily="34" charset="0"/>
+                <a:ea typeface="Calibri" panose="020F0502020204030204" pitchFamily="34" charset="0"/>
+                <a:cs typeface="Calibri" panose="020F0502020204030204" pitchFamily="34" charset="0"/>
+              </a:rPr>
+              <a:t>gene_expression</a:t>
+            </a:r>
+            <a:r>
+              <a:rPr lang="en-US" altLang="zh-CN" sz="1400" dirty="0">
+                <a:latin typeface="Calibri" panose="020F0502020204030204" pitchFamily="34" charset="0"/>
+                <a:ea typeface="Calibri" panose="020F0502020204030204" pitchFamily="34" charset="0"/>
+                <a:cs typeface="Calibri" panose="020F0502020204030204" pitchFamily="34" charset="0"/>
+              </a:rPr>
+              <a:t> + treatment + </a:t>
+            </a:r>
+            <a:r>
+              <a:rPr lang="en-US" altLang="zh-CN" sz="1400" dirty="0" err="1">
+                <a:latin typeface="Calibri" panose="020F0502020204030204" pitchFamily="34" charset="0"/>
+                <a:ea typeface="Calibri" panose="020F0502020204030204" pitchFamily="34" charset="0"/>
+                <a:cs typeface="Calibri" panose="020F0502020204030204" pitchFamily="34" charset="0"/>
+              </a:rPr>
+              <a:t>gene_expression:treatment</a:t>
+            </a:r>
+            <a:endParaRPr lang="zh-CN" altLang="en-US" sz="1400" dirty="0">
+              <a:latin typeface="Calibri" panose="020F0502020204030204" pitchFamily="34" charset="0"/>
+              <a:cs typeface="Calibri" panose="020F0502020204030204" pitchFamily="34" charset="0"/>
+            </a:endParaRPr>
+          </a:p>
+        </p:txBody>
+      </p:sp>
+      <p:sp>
+        <p:nvSpPr>
+          <p:cNvPr id="8" name="TextBox 7">
+            <a:extLst>
+              <a:ext uri="{FF2B5EF4-FFF2-40B4-BE49-F238E27FC236}">
+                <a16:creationId xmlns:a16="http://schemas.microsoft.com/office/drawing/2014/main" id="{F898A85E-F9DD-1BD9-D814-809AE4BA149E}"/>
+              </a:ext>
+            </a:extLst>
+          </p:cNvPr>
+          <p:cNvSpPr txBox="1"/>
+          <p:nvPr/>
+        </p:nvSpPr>
+        <p:spPr>
+          <a:xfrm>
+            <a:off x="2270314" y="4056055"/>
+            <a:ext cx="2882520" cy="307777"/>
+          </a:xfrm>
+          <a:prstGeom prst="rect">
+            <a:avLst/>
+          </a:prstGeom>
+          <a:noFill/>
+        </p:spPr>
+        <p:txBody>
+          <a:bodyPr wrap="none" rtlCol="0">
+            <a:spAutoFit/>
+          </a:bodyPr>
+          <a:lstStyle/>
+          <a:p>
+            <a:r>
+              <a:rPr lang="en-US" altLang="zh-CN" sz="1400" dirty="0" err="1">
+                <a:latin typeface="Calibri" panose="020F0502020204030204" pitchFamily="34" charset="0"/>
+                <a:ea typeface="Calibri" panose="020F0502020204030204" pitchFamily="34" charset="0"/>
+                <a:cs typeface="Calibri" panose="020F0502020204030204" pitchFamily="34" charset="0"/>
+              </a:rPr>
+              <a:t>Surv</a:t>
+            </a:r>
+            <a:r>
+              <a:rPr lang="en-US" altLang="zh-CN" sz="1400" dirty="0">
+                <a:latin typeface="Calibri" panose="020F0502020204030204" pitchFamily="34" charset="0"/>
+                <a:ea typeface="Calibri" panose="020F0502020204030204" pitchFamily="34" charset="0"/>
+                <a:cs typeface="Calibri" panose="020F0502020204030204" pitchFamily="34" charset="0"/>
+              </a:rPr>
+              <a:t>(</a:t>
+            </a:r>
+            <a:r>
+              <a:rPr lang="en-US" altLang="zh-CN" sz="1400" dirty="0" err="1">
+                <a:latin typeface="Calibri" panose="020F0502020204030204" pitchFamily="34" charset="0"/>
+                <a:ea typeface="Calibri" panose="020F0502020204030204" pitchFamily="34" charset="0"/>
+                <a:cs typeface="Calibri" panose="020F0502020204030204" pitchFamily="34" charset="0"/>
+              </a:rPr>
+              <a:t>time.pfs</a:t>
+            </a:r>
+            <a:r>
+              <a:rPr lang="en-US" altLang="zh-CN" sz="1400" dirty="0">
+                <a:latin typeface="Calibri" panose="020F0502020204030204" pitchFamily="34" charset="0"/>
+                <a:ea typeface="Calibri" panose="020F0502020204030204" pitchFamily="34" charset="0"/>
+                <a:cs typeface="Calibri" panose="020F0502020204030204" pitchFamily="34" charset="0"/>
+              </a:rPr>
+              <a:t>, </a:t>
+            </a:r>
+            <a:r>
+              <a:rPr lang="en-US" altLang="zh-CN" sz="1400" dirty="0" err="1">
+                <a:latin typeface="Calibri" panose="020F0502020204030204" pitchFamily="34" charset="0"/>
+                <a:ea typeface="Calibri" panose="020F0502020204030204" pitchFamily="34" charset="0"/>
+                <a:cs typeface="Calibri" panose="020F0502020204030204" pitchFamily="34" charset="0"/>
+              </a:rPr>
+              <a:t>event.pfs</a:t>
+            </a:r>
+            <a:r>
+              <a:rPr lang="en-US" altLang="zh-CN" sz="1400" dirty="0">
+                <a:latin typeface="Calibri" panose="020F0502020204030204" pitchFamily="34" charset="0"/>
+                <a:ea typeface="Calibri" panose="020F0502020204030204" pitchFamily="34" charset="0"/>
+                <a:cs typeface="Calibri" panose="020F0502020204030204" pitchFamily="34" charset="0"/>
+              </a:rPr>
+              <a:t>) ~ treatment</a:t>
+            </a:r>
+            <a:endParaRPr lang="zh-CN" altLang="en-US" sz="1400" dirty="0">
+              <a:latin typeface="Calibri" panose="020F0502020204030204" pitchFamily="34" charset="0"/>
+              <a:cs typeface="Calibri" panose="020F0502020204030204" pitchFamily="34" charset="0"/>
+            </a:endParaRPr>
+          </a:p>
+        </p:txBody>
+      </p:sp>
+      <p:cxnSp>
+        <p:nvCxnSpPr>
+          <p:cNvPr id="11" name="Straight Connector 10">
+            <a:extLst>
+              <a:ext uri="{FF2B5EF4-FFF2-40B4-BE49-F238E27FC236}">
+                <a16:creationId xmlns:a16="http://schemas.microsoft.com/office/drawing/2014/main" id="{311C81DC-EE0E-FAD7-CADB-857B04CD50FF}"/>
+              </a:ext>
+            </a:extLst>
+          </p:cNvPr>
+          <p:cNvCxnSpPr/>
+          <p:nvPr/>
+        </p:nvCxnSpPr>
+        <p:spPr>
+          <a:xfrm flipH="1" flipV="1">
+            <a:off x="1285094" y="1243218"/>
+            <a:ext cx="566420" cy="193962"/>
+          </a:xfrm>
+          <a:prstGeom prst="line">
+            <a:avLst/>
+          </a:prstGeom>
+          <a:ln w="28575"/>
+        </p:spPr>
+        <p:style>
+          <a:lnRef idx="2">
+            <a:schemeClr val="accent1"/>
+          </a:lnRef>
+          <a:fillRef idx="0">
+            <a:schemeClr val="accent1"/>
+          </a:fillRef>
+          <a:effectRef idx="1">
+            <a:schemeClr val="accent1"/>
+          </a:effectRef>
+          <a:fontRef idx="minor">
+            <a:schemeClr val="tx1"/>
+          </a:fontRef>
+        </p:style>
+      </p:cxnSp>
+      <p:cxnSp>
+        <p:nvCxnSpPr>
+          <p:cNvPr id="13" name="Straight Connector 12">
+            <a:extLst>
+              <a:ext uri="{FF2B5EF4-FFF2-40B4-BE49-F238E27FC236}">
+                <a16:creationId xmlns:a16="http://schemas.microsoft.com/office/drawing/2014/main" id="{8A361142-3122-9830-314A-8A77C074BF21}"/>
+              </a:ext>
+            </a:extLst>
+          </p:cNvPr>
+          <p:cNvCxnSpPr>
+            <a:cxnSpLocks/>
+          </p:cNvCxnSpPr>
+          <p:nvPr/>
+        </p:nvCxnSpPr>
+        <p:spPr>
+          <a:xfrm flipH="1">
+            <a:off x="1840084" y="1250982"/>
+            <a:ext cx="548966" cy="188561"/>
+          </a:xfrm>
+          <a:prstGeom prst="line">
+            <a:avLst/>
+          </a:prstGeom>
+          <a:ln w="28575"/>
+        </p:spPr>
+        <p:style>
+          <a:lnRef idx="2">
+            <a:schemeClr val="accent1"/>
+          </a:lnRef>
+          <a:fillRef idx="0">
+            <a:schemeClr val="accent1"/>
+          </a:fillRef>
+          <a:effectRef idx="1">
+            <a:schemeClr val="accent1"/>
+          </a:effectRef>
+          <a:fontRef idx="minor">
+            <a:schemeClr val="tx1"/>
+          </a:fontRef>
+        </p:style>
+      </p:cxnSp>
+      <p:cxnSp>
+        <p:nvCxnSpPr>
+          <p:cNvPr id="18" name="Straight Connector 17">
+            <a:extLst>
+              <a:ext uri="{FF2B5EF4-FFF2-40B4-BE49-F238E27FC236}">
+                <a16:creationId xmlns:a16="http://schemas.microsoft.com/office/drawing/2014/main" id="{FE385B46-EB28-A696-5B07-0C9D08A83929}"/>
+              </a:ext>
+            </a:extLst>
+          </p:cNvPr>
+          <p:cNvCxnSpPr>
+            <a:cxnSpLocks/>
+          </p:cNvCxnSpPr>
+          <p:nvPr/>
+        </p:nvCxnSpPr>
+        <p:spPr>
+          <a:xfrm flipH="1">
+            <a:off x="2502039" y="3938707"/>
+            <a:ext cx="701253" cy="173980"/>
+          </a:xfrm>
+          <a:prstGeom prst="line">
+            <a:avLst/>
+          </a:prstGeom>
+          <a:ln w="28575"/>
+        </p:spPr>
+        <p:style>
+          <a:lnRef idx="2">
+            <a:schemeClr val="accent1"/>
+          </a:lnRef>
+          <a:fillRef idx="0">
+            <a:schemeClr val="accent1"/>
+          </a:fillRef>
+          <a:effectRef idx="1">
+            <a:schemeClr val="accent1"/>
+          </a:effectRef>
+          <a:fontRef idx="minor">
+            <a:schemeClr val="tx1"/>
+          </a:fontRef>
+        </p:style>
+      </p:cxnSp>
+      <p:cxnSp>
+        <p:nvCxnSpPr>
+          <p:cNvPr id="19" name="Straight Connector 18">
+            <a:extLst>
+              <a:ext uri="{FF2B5EF4-FFF2-40B4-BE49-F238E27FC236}">
+                <a16:creationId xmlns:a16="http://schemas.microsoft.com/office/drawing/2014/main" id="{810A1866-8AD1-53C1-8C73-E56A5F785D15}"/>
+              </a:ext>
+            </a:extLst>
+          </p:cNvPr>
+          <p:cNvCxnSpPr>
+            <a:cxnSpLocks/>
+          </p:cNvCxnSpPr>
+          <p:nvPr/>
+        </p:nvCxnSpPr>
+        <p:spPr>
+          <a:xfrm flipH="1" flipV="1">
+            <a:off x="4318562" y="3938707"/>
+            <a:ext cx="617316" cy="159185"/>
+          </a:xfrm>
+          <a:prstGeom prst="line">
+            <a:avLst/>
+          </a:prstGeom>
+          <a:ln w="28575"/>
+        </p:spPr>
+        <p:style>
+          <a:lnRef idx="2">
+            <a:schemeClr val="accent1"/>
+          </a:lnRef>
+          <a:fillRef idx="0">
+            <a:schemeClr val="accent1"/>
+          </a:fillRef>
+          <a:effectRef idx="1">
+            <a:schemeClr val="accent1"/>
+          </a:effectRef>
+          <a:fontRef idx="minor">
+            <a:schemeClr val="tx1"/>
+          </a:fontRef>
+        </p:style>
+      </p:cxnSp>
     </p:spTree>
     <p:extLst>
       <p:ext uri="{BB962C8B-B14F-4D97-AF65-F5344CB8AC3E}">

</xml_diff>